<commit_message>
Finalised materials for Week 1.
</commit_message>
<xml_diff>
--- a/W1/0. All/Code files/Misc/Some_neural_networks_diagrams.pptx
+++ b/W1/0. All/Code files/Misc/Some_neural_networks_diagrams.pptx
@@ -106,19 +106,64 @@
       </a:defRPr>
     </a:lvl9pPr>
   </p:defaultTextStyle>
+  <p:extLst>
+    <p:ext uri="{EFAFB233-063F-42B5-8137-9DF3F51BA10A}">
+      <p15:sldGuideLst xmlns:p15="http://schemas.microsoft.com/office/powerpoint/2012/main"/>
+    </p:ext>
+  </p:extLst>
 </p:presentation>
 </file>
 
 <file path=ppt/revisionInfo.xml><?xml version="1.0" encoding="utf-8"?>
 <p1510:revInfo xmlns:a="http://schemas.openxmlformats.org/drawingml/2006/main" xmlns:r="http://schemas.openxmlformats.org/officeDocument/2006/relationships" xmlns:p1510="http://schemas.microsoft.com/office/powerpoint/2015/10/main">
   <p1510:revLst>
-    <p1510:client id="{2D44041B-C8B7-4B8E-A0F4-2B4866FEB435}" v="261" dt="2022-12-13T12:53:30.027"/>
+    <p1510:client id="{23890D2B-5D6C-432C-828D-FBF8CC830F3A}" v="6" dt="2023-01-25T05:27:30.506"/>
   </p1510:revLst>
 </p1510:revInfo>
 </file>
 
 <file path=ppt/changesInfos/changesInfo1.xml><?xml version="1.0" encoding="utf-8"?>
 <pc:chgInfo xmlns:a="http://schemas.openxmlformats.org/drawingml/2006/main" xmlns:r="http://schemas.openxmlformats.org/officeDocument/2006/relationships" xmlns:ac="http://schemas.microsoft.com/office/drawing/2013/main/command" xmlns:pc="http://schemas.microsoft.com/office/powerpoint/2013/main/command">
+  <pc:docChgLst>
+    <pc:chgData name="Matthieu De Mari" userId="dfb708c9-d8dc-439f-9a3b-c772bf4a311c" providerId="ADAL" clId="{23890D2B-5D6C-432C-828D-FBF8CC830F3A}"/>
+    <pc:docChg chg="modSld">
+      <pc:chgData name="Matthieu De Mari" userId="dfb708c9-d8dc-439f-9a3b-c772bf4a311c" providerId="ADAL" clId="{23890D2B-5D6C-432C-828D-FBF8CC830F3A}" dt="2023-01-25T05:27:30.506" v="5" actId="20577"/>
+      <pc:docMkLst>
+        <pc:docMk/>
+      </pc:docMkLst>
+      <pc:sldChg chg="modSp">
+        <pc:chgData name="Matthieu De Mari" userId="dfb708c9-d8dc-439f-9a3b-c772bf4a311c" providerId="ADAL" clId="{23890D2B-5D6C-432C-828D-FBF8CC830F3A}" dt="2023-01-25T05:27:30.506" v="5" actId="20577"/>
+        <pc:sldMkLst>
+          <pc:docMk/>
+          <pc:sldMk cId="3293759679" sldId="258"/>
+        </pc:sldMkLst>
+        <pc:spChg chg="mod">
+          <ac:chgData name="Matthieu De Mari" userId="dfb708c9-d8dc-439f-9a3b-c772bf4a311c" providerId="ADAL" clId="{23890D2B-5D6C-432C-828D-FBF8CC830F3A}" dt="2023-01-25T05:27:30.506" v="5" actId="20577"/>
+          <ac:spMkLst>
+            <pc:docMk/>
+            <pc:sldMk cId="3293759679" sldId="258"/>
+            <ac:spMk id="40" creationId="{726542F6-6D27-24BD-EC9D-6DFE86DDC5F3}"/>
+          </ac:spMkLst>
+        </pc:spChg>
+        <pc:spChg chg="mod">
+          <ac:chgData name="Matthieu De Mari" userId="dfb708c9-d8dc-439f-9a3b-c772bf4a311c" providerId="ADAL" clId="{23890D2B-5D6C-432C-828D-FBF8CC830F3A}" dt="2023-01-25T05:27:25.522" v="1" actId="20577"/>
+          <ac:spMkLst>
+            <pc:docMk/>
+            <pc:sldMk cId="3293759679" sldId="258"/>
+            <ac:spMk id="61" creationId="{2A14CCD1-4F1A-5203-E634-5770335D5C71}"/>
+          </ac:spMkLst>
+        </pc:spChg>
+        <pc:spChg chg="mod">
+          <ac:chgData name="Matthieu De Mari" userId="dfb708c9-d8dc-439f-9a3b-c772bf4a311c" providerId="ADAL" clId="{23890D2B-5D6C-432C-828D-FBF8CC830F3A}" dt="2023-01-25T05:27:27.711" v="3" actId="20577"/>
+          <ac:spMkLst>
+            <pc:docMk/>
+            <pc:sldMk cId="3293759679" sldId="258"/>
+            <ac:spMk id="62" creationId="{A673E53B-F22D-30EC-7620-4097C1AE7C4C}"/>
+          </ac:spMkLst>
+        </pc:spChg>
+      </pc:sldChg>
+    </pc:docChg>
+  </pc:docChgLst>
   <pc:docChgLst>
     <pc:chgData name="Matthieu De Mari" userId="dfb708c9-d8dc-439f-9a3b-c772bf4a311c" providerId="ADAL" clId="{2D44041B-C8B7-4B8E-A0F4-2B4866FEB435}"/>
     <pc:docChg chg="undo custSel mod addSld modSld modMainMaster">
@@ -1396,7 +1441,7 @@
           <a:p>
             <a:fld id="{A090A5D8-D40D-45B7-B482-7FD296FEC384}" type="datetimeFigureOut">
               <a:rPr lang="en-SG" smtClean="0"/>
-              <a:t>13/12/2022</a:t>
+              <a:t>25/1/2023</a:t>
             </a:fld>
             <a:endParaRPr lang="en-SG"/>
           </a:p>
@@ -1596,7 +1641,7 @@
           <a:p>
             <a:fld id="{A090A5D8-D40D-45B7-B482-7FD296FEC384}" type="datetimeFigureOut">
               <a:rPr lang="en-SG" smtClean="0"/>
-              <a:t>13/12/2022</a:t>
+              <a:t>25/1/2023</a:t>
             </a:fld>
             <a:endParaRPr lang="en-SG"/>
           </a:p>
@@ -1806,7 +1851,7 @@
           <a:p>
             <a:fld id="{A090A5D8-D40D-45B7-B482-7FD296FEC384}" type="datetimeFigureOut">
               <a:rPr lang="en-SG" smtClean="0"/>
-              <a:t>13/12/2022</a:t>
+              <a:t>25/1/2023</a:t>
             </a:fld>
             <a:endParaRPr lang="en-SG"/>
           </a:p>
@@ -2006,7 +2051,7 @@
           <a:p>
             <a:fld id="{A090A5D8-D40D-45B7-B482-7FD296FEC384}" type="datetimeFigureOut">
               <a:rPr lang="en-SG" smtClean="0"/>
-              <a:t>13/12/2022</a:t>
+              <a:t>25/1/2023</a:t>
             </a:fld>
             <a:endParaRPr lang="en-SG"/>
           </a:p>
@@ -2282,7 +2327,7 @@
           <a:p>
             <a:fld id="{A090A5D8-D40D-45B7-B482-7FD296FEC384}" type="datetimeFigureOut">
               <a:rPr lang="en-SG" smtClean="0"/>
-              <a:t>13/12/2022</a:t>
+              <a:t>25/1/2023</a:t>
             </a:fld>
             <a:endParaRPr lang="en-SG"/>
           </a:p>
@@ -2550,7 +2595,7 @@
           <a:p>
             <a:fld id="{A090A5D8-D40D-45B7-B482-7FD296FEC384}" type="datetimeFigureOut">
               <a:rPr lang="en-SG" smtClean="0"/>
-              <a:t>13/12/2022</a:t>
+              <a:t>25/1/2023</a:t>
             </a:fld>
             <a:endParaRPr lang="en-SG"/>
           </a:p>
@@ -2965,7 +3010,7 @@
           <a:p>
             <a:fld id="{A090A5D8-D40D-45B7-B482-7FD296FEC384}" type="datetimeFigureOut">
               <a:rPr lang="en-SG" smtClean="0"/>
-              <a:t>13/12/2022</a:t>
+              <a:t>25/1/2023</a:t>
             </a:fld>
             <a:endParaRPr lang="en-SG"/>
           </a:p>
@@ -3107,7 +3152,7 @@
           <a:p>
             <a:fld id="{A090A5D8-D40D-45B7-B482-7FD296FEC384}" type="datetimeFigureOut">
               <a:rPr lang="en-SG" smtClean="0"/>
-              <a:t>13/12/2022</a:t>
+              <a:t>25/1/2023</a:t>
             </a:fld>
             <a:endParaRPr lang="en-SG"/>
           </a:p>
@@ -3220,7 +3265,7 @@
           <a:p>
             <a:fld id="{A090A5D8-D40D-45B7-B482-7FD296FEC384}" type="datetimeFigureOut">
               <a:rPr lang="en-SG" smtClean="0"/>
-              <a:t>13/12/2022</a:t>
+              <a:t>25/1/2023</a:t>
             </a:fld>
             <a:endParaRPr lang="en-SG"/>
           </a:p>
@@ -3533,7 +3578,7 @@
           <a:p>
             <a:fld id="{A090A5D8-D40D-45B7-B482-7FD296FEC384}" type="datetimeFigureOut">
               <a:rPr lang="en-SG" smtClean="0"/>
-              <a:t>13/12/2022</a:t>
+              <a:t>25/1/2023</a:t>
             </a:fld>
             <a:endParaRPr lang="en-SG"/>
           </a:p>
@@ -3822,7 +3867,7 @@
           <a:p>
             <a:fld id="{A090A5D8-D40D-45B7-B482-7FD296FEC384}" type="datetimeFigureOut">
               <a:rPr lang="en-SG" smtClean="0"/>
-              <a:t>13/12/2022</a:t>
+              <a:t>25/1/2023</a:t>
             </a:fld>
             <a:endParaRPr lang="en-SG"/>
           </a:p>
@@ -4065,7 +4110,7 @@
           <a:p>
             <a:fld id="{A090A5D8-D40D-45B7-B482-7FD296FEC384}" type="datetimeFigureOut">
               <a:rPr lang="en-SG" smtClean="0"/>
-              <a:t>13/12/2022</a:t>
+              <a:t>25/1/2023</a:t>
             </a:fld>
             <a:endParaRPr lang="en-SG"/>
           </a:p>
@@ -4734,8 +4779,8 @@
           </a:p>
         </p:txBody>
       </p:sp>
-      <mc:AlternateContent xmlns:mc="http://schemas.openxmlformats.org/markup-compatibility/2006">
-        <mc:Choice xmlns:a14="http://schemas.microsoft.com/office/drawing/2010/main" Requires="a14">
+      <mc:AlternateContent xmlns:mc="http://schemas.openxmlformats.org/markup-compatibility/2006" xmlns:a14="http://schemas.microsoft.com/office/drawing/2010/main">
+        <mc:Choice Requires="a14">
           <p:sp>
             <p:nvSpPr>
               <p:cNvPr id="6" name="Oval 5">
@@ -4825,7 +4870,7 @@
             </p:txBody>
           </p:sp>
         </mc:Choice>
-        <mc:Fallback>
+        <mc:Fallback xmlns="">
           <p:sp>
             <p:nvSpPr>
               <p:cNvPr id="6" name="Oval 5">
@@ -4879,8 +4924,8 @@
           </p:sp>
         </mc:Fallback>
       </mc:AlternateContent>
-      <mc:AlternateContent xmlns:mc="http://schemas.openxmlformats.org/markup-compatibility/2006">
-        <mc:Choice xmlns:a14="http://schemas.microsoft.com/office/drawing/2010/main" Requires="a14">
+      <mc:AlternateContent xmlns:mc="http://schemas.openxmlformats.org/markup-compatibility/2006" xmlns:a14="http://schemas.microsoft.com/office/drawing/2010/main">
+        <mc:Choice Requires="a14">
           <p:sp>
             <p:nvSpPr>
               <p:cNvPr id="7" name="Oval 6">
@@ -4970,7 +5015,7 @@
             </p:txBody>
           </p:sp>
         </mc:Choice>
-        <mc:Fallback>
+        <mc:Fallback xmlns="">
           <p:sp>
             <p:nvSpPr>
               <p:cNvPr id="7" name="Oval 6">
@@ -5024,8 +5069,8 @@
           </p:sp>
         </mc:Fallback>
       </mc:AlternateContent>
-      <mc:AlternateContent xmlns:mc="http://schemas.openxmlformats.org/markup-compatibility/2006">
-        <mc:Choice xmlns:a14="http://schemas.microsoft.com/office/drawing/2010/main" Requires="a14">
+      <mc:AlternateContent xmlns:mc="http://schemas.openxmlformats.org/markup-compatibility/2006" xmlns:a14="http://schemas.microsoft.com/office/drawing/2010/main">
+        <mc:Choice Requires="a14">
           <p:sp>
             <p:nvSpPr>
               <p:cNvPr id="8" name="Oval 7">
@@ -5115,7 +5160,7 @@
             </p:txBody>
           </p:sp>
         </mc:Choice>
-        <mc:Fallback>
+        <mc:Fallback xmlns="">
           <p:sp>
             <p:nvSpPr>
               <p:cNvPr id="8" name="Oval 7">
@@ -5379,8 +5424,8 @@
           </a:fontRef>
         </p:style>
       </p:cxnSp>
-      <mc:AlternateContent xmlns:mc="http://schemas.openxmlformats.org/markup-compatibility/2006">
-        <mc:Choice xmlns:a14="http://schemas.microsoft.com/office/drawing/2010/main" Requires="a14">
+      <mc:AlternateContent xmlns:mc="http://schemas.openxmlformats.org/markup-compatibility/2006" xmlns:a14="http://schemas.microsoft.com/office/drawing/2010/main">
+        <mc:Choice Requires="a14">
           <p:sp>
             <p:nvSpPr>
               <p:cNvPr id="23" name="Oval 22">
@@ -5470,7 +5515,7 @@
             </p:txBody>
           </p:sp>
         </mc:Choice>
-        <mc:Fallback>
+        <mc:Fallback xmlns="">
           <p:sp>
             <p:nvSpPr>
               <p:cNvPr id="23" name="Oval 22">
@@ -5814,8 +5859,8 @@
           </a:p>
         </p:txBody>
       </p:sp>
-      <mc:AlternateContent xmlns:mc="http://schemas.openxmlformats.org/markup-compatibility/2006">
-        <mc:Choice xmlns:a14="http://schemas.microsoft.com/office/drawing/2010/main" Requires="a14">
+      <mc:AlternateContent xmlns:mc="http://schemas.openxmlformats.org/markup-compatibility/2006" xmlns:a14="http://schemas.microsoft.com/office/drawing/2010/main">
+        <mc:Choice Requires="a14">
           <p:sp>
             <p:nvSpPr>
               <p:cNvPr id="37" name="TextBox 36">
@@ -6027,7 +6072,7 @@
             </p:txBody>
           </p:sp>
         </mc:Choice>
-        <mc:Fallback>
+        <mc:Fallback xmlns="">
           <p:sp>
             <p:nvSpPr>
               <p:cNvPr id="37" name="TextBox 36">
@@ -6109,8 +6154,8 @@
           </a:p>
         </p:txBody>
       </p:sp>
-      <mc:AlternateContent xmlns:mc="http://schemas.openxmlformats.org/markup-compatibility/2006">
-        <mc:Choice xmlns:a14="http://schemas.microsoft.com/office/drawing/2010/main" Requires="a14">
+      <mc:AlternateContent xmlns:mc="http://schemas.openxmlformats.org/markup-compatibility/2006" xmlns:a14="http://schemas.microsoft.com/office/drawing/2010/main">
+        <mc:Choice Requires="a14">
           <p:sp>
             <p:nvSpPr>
               <p:cNvPr id="42" name="Oval 41">
@@ -6200,7 +6245,7 @@
             </p:txBody>
           </p:sp>
         </mc:Choice>
-        <mc:Fallback>
+        <mc:Fallback xmlns="">
           <p:sp>
             <p:nvSpPr>
               <p:cNvPr id="42" name="Oval 41">
@@ -6254,8 +6299,8 @@
           </p:sp>
         </mc:Fallback>
       </mc:AlternateContent>
-      <mc:AlternateContent xmlns:mc="http://schemas.openxmlformats.org/markup-compatibility/2006">
-        <mc:Choice xmlns:a14="http://schemas.microsoft.com/office/drawing/2010/main" Requires="a14">
+      <mc:AlternateContent xmlns:mc="http://schemas.openxmlformats.org/markup-compatibility/2006" xmlns:a14="http://schemas.microsoft.com/office/drawing/2010/main">
+        <mc:Choice Requires="a14">
           <p:sp>
             <p:nvSpPr>
               <p:cNvPr id="43" name="Oval 42">
@@ -6345,7 +6390,7 @@
             </p:txBody>
           </p:sp>
         </mc:Choice>
-        <mc:Fallback>
+        <mc:Fallback xmlns="">
           <p:sp>
             <p:nvSpPr>
               <p:cNvPr id="43" name="Oval 42">
@@ -7021,8 +7066,8 @@
           </a:p>
         </p:txBody>
       </p:sp>
-      <mc:AlternateContent xmlns:mc="http://schemas.openxmlformats.org/markup-compatibility/2006">
-        <mc:Choice xmlns:a14="http://schemas.microsoft.com/office/drawing/2010/main" Requires="a14">
+      <mc:AlternateContent xmlns:mc="http://schemas.openxmlformats.org/markup-compatibility/2006" xmlns:a14="http://schemas.microsoft.com/office/drawing/2010/main">
+        <mc:Choice Requires="a14">
           <p:sp>
             <p:nvSpPr>
               <p:cNvPr id="37" name="TextBox 36">
@@ -7159,7 +7204,7 @@
             </p:txBody>
           </p:sp>
         </mc:Choice>
-        <mc:Fallback>
+        <mc:Fallback xmlns="">
           <p:sp>
             <p:nvSpPr>
               <p:cNvPr id="37" name="TextBox 36">
@@ -7339,8 +7384,8 @@
           </a:fontRef>
         </p:style>
       </p:cxnSp>
-      <mc:AlternateContent xmlns:mc="http://schemas.openxmlformats.org/markup-compatibility/2006">
-        <mc:Choice xmlns:a14="http://schemas.microsoft.com/office/drawing/2010/main" Requires="a14">
+      <mc:AlternateContent xmlns:mc="http://schemas.openxmlformats.org/markup-compatibility/2006" xmlns:a14="http://schemas.microsoft.com/office/drawing/2010/main">
+        <mc:Choice Requires="a14">
           <p:sp>
             <p:nvSpPr>
               <p:cNvPr id="39" name="Rectangle: Rounded Corners 38">
@@ -7430,7 +7475,7 @@
             </p:txBody>
           </p:sp>
         </mc:Choice>
-        <mc:Fallback>
+        <mc:Fallback xmlns="">
           <p:sp>
             <p:nvSpPr>
               <p:cNvPr id="39" name="Rectangle: Rounded Corners 38">
@@ -7586,7 +7631,7 @@
                                 <a:rPr lang="en-GB" b="0" i="1" smtClean="0">
                                   <a:latin typeface="Cambria Math" panose="02040503050406030204" pitchFamily="18" charset="0"/>
                                 </a:rPr>
-                                <m:t>h</m:t>
+                                <m:t>𝑦</m:t>
                               </m:r>
                             </m:sub>
                           </m:sSub>
@@ -7691,8 +7736,8 @@
           </a:p>
         </p:txBody>
       </p:sp>
-      <mc:AlternateContent xmlns:mc="http://schemas.openxmlformats.org/markup-compatibility/2006">
-        <mc:Choice xmlns:a14="http://schemas.microsoft.com/office/drawing/2010/main" Requires="a14">
+      <mc:AlternateContent xmlns:mc="http://schemas.openxmlformats.org/markup-compatibility/2006" xmlns:a14="http://schemas.microsoft.com/office/drawing/2010/main">
+        <mc:Choice Requires="a14">
           <p:sp>
             <p:nvSpPr>
               <p:cNvPr id="58" name="Rectangle: Rounded Corners 57">
@@ -7782,7 +7827,7 @@
             </p:txBody>
           </p:sp>
         </mc:Choice>
-        <mc:Fallback>
+        <mc:Fallback xmlns="">
           <p:sp>
             <p:nvSpPr>
               <p:cNvPr id="58" name="Rectangle: Rounded Corners 57">
@@ -7836,8 +7881,8 @@
           </p:sp>
         </mc:Fallback>
       </mc:AlternateContent>
-      <mc:AlternateContent xmlns:mc="http://schemas.openxmlformats.org/markup-compatibility/2006">
-        <mc:Choice xmlns:a14="http://schemas.microsoft.com/office/drawing/2010/main" Requires="a14">
+      <mc:AlternateContent xmlns:mc="http://schemas.openxmlformats.org/markup-compatibility/2006" xmlns:a14="http://schemas.microsoft.com/office/drawing/2010/main">
+        <mc:Choice Requires="a14">
           <p:sp>
             <p:nvSpPr>
               <p:cNvPr id="59" name="Rectangle: Rounded Corners 58">
@@ -7952,7 +7997,7 @@
             </p:txBody>
           </p:sp>
         </mc:Choice>
-        <mc:Fallback>
+        <mc:Fallback xmlns="">
           <p:sp>
             <p:nvSpPr>
               <p:cNvPr id="59" name="Rectangle: Rounded Corners 58">
@@ -8170,7 +8215,7 @@
                                 <a:rPr lang="en-GB" b="0" i="1" smtClean="0">
                                   <a:latin typeface="Cambria Math" panose="02040503050406030204" pitchFamily="18" charset="0"/>
                                 </a:rPr>
-                                <m:t>h</m:t>
+                                <m:t>𝑦</m:t>
                               </m:r>
                             </m:sub>
                           </m:sSub>
@@ -8210,7 +8255,7 @@
               <a:blipFill>
                 <a:blip r:embed="rId7"/>
                 <a:stretch>
-                  <a:fillRect l="-1538"/>
+                  <a:fillRect l="-769"/>
                 </a:stretch>
               </a:blipFill>
               <a:ln w="38100" cap="flat" cmpd="sng" algn="ctr">
@@ -8365,7 +8410,7 @@
                                 <a:rPr lang="en-GB" b="0" i="1" smtClean="0">
                                   <a:latin typeface="Cambria Math" panose="02040503050406030204" pitchFamily="18" charset="0"/>
                                 </a:rPr>
-                                <m:t>h</m:t>
+                                <m:t>𝑦</m:t>
                               </m:r>
                             </m:sub>
                           </m:sSub>
@@ -8405,7 +8450,7 @@
               <a:blipFill>
                 <a:blip r:embed="rId8"/>
                 <a:stretch>
-                  <a:fillRect l="-1538"/>
+                  <a:fillRect l="-769"/>
                 </a:stretch>
               </a:blipFill>
               <a:ln w="38100" cap="flat" cmpd="sng" algn="ctr">
@@ -8544,8 +8589,8 @@
           </a:p>
         </p:txBody>
       </p:sp>
-      <mc:AlternateContent xmlns:mc="http://schemas.openxmlformats.org/markup-compatibility/2006">
-        <mc:Choice xmlns:a14="http://schemas.microsoft.com/office/drawing/2010/main" Requires="a14">
+      <mc:AlternateContent xmlns:mc="http://schemas.openxmlformats.org/markup-compatibility/2006" xmlns:a14="http://schemas.microsoft.com/office/drawing/2010/main">
+        <mc:Choice Requires="a14">
           <p:sp>
             <p:nvSpPr>
               <p:cNvPr id="91" name="Rectangle: Rounded Corners 90">
@@ -8623,13 +8668,7 @@
                             <a:rPr lang="en-GB" b="0" i="1" smtClean="0">
                               <a:latin typeface="Cambria Math" panose="02040503050406030204" pitchFamily="18" charset="0"/>
                             </a:rPr>
-                            <m:t>1</m:t>
-                          </m:r>
-                          <m:r>
-                            <a:rPr lang="en-GB" b="0" i="1" smtClean="0">
-                              <a:latin typeface="Cambria Math" panose="02040503050406030204" pitchFamily="18" charset="0"/>
-                            </a:rPr>
-                            <m:t>,</m:t>
+                            <m:t>1,</m:t>
                           </m:r>
                           <m:sSub>
                             <m:sSubPr>
@@ -8666,7 +8705,7 @@
             </p:txBody>
           </p:sp>
         </mc:Choice>
-        <mc:Fallback>
+        <mc:Fallback xmlns="">
           <p:sp>
             <p:nvSpPr>
               <p:cNvPr id="91" name="Rectangle: Rounded Corners 90">
@@ -8757,8 +8796,8 @@
           </a:p>
         </p:txBody>
       </p:sp>
-      <mc:AlternateContent xmlns:mc="http://schemas.openxmlformats.org/markup-compatibility/2006">
-        <mc:Choice xmlns:a14="http://schemas.microsoft.com/office/drawing/2010/main" Requires="a14">
+      <mc:AlternateContent xmlns:mc="http://schemas.openxmlformats.org/markup-compatibility/2006" xmlns:a14="http://schemas.microsoft.com/office/drawing/2010/main">
+        <mc:Choice Requires="a14">
           <p:sp>
             <p:nvSpPr>
               <p:cNvPr id="93" name="Rectangle: Rounded Corners 92">
@@ -8848,7 +8887,7 @@
             </p:txBody>
           </p:sp>
         </mc:Choice>
-        <mc:Fallback>
+        <mc:Fallback xmlns="">
           <p:sp>
             <p:nvSpPr>
               <p:cNvPr id="93" name="Rectangle: Rounded Corners 92">
@@ -8902,8 +8941,8 @@
           </p:sp>
         </mc:Fallback>
       </mc:AlternateContent>
-      <mc:AlternateContent xmlns:mc="http://schemas.openxmlformats.org/markup-compatibility/2006">
-        <mc:Choice xmlns:a14="http://schemas.microsoft.com/office/drawing/2010/main" Requires="a14">
+      <mc:AlternateContent xmlns:mc="http://schemas.openxmlformats.org/markup-compatibility/2006" xmlns:a14="http://schemas.microsoft.com/office/drawing/2010/main">
+        <mc:Choice Requires="a14">
           <p:sp>
             <p:nvSpPr>
               <p:cNvPr id="94" name="Rectangle: Rounded Corners 93">
@@ -9012,7 +9051,7 @@
             </p:txBody>
           </p:sp>
         </mc:Choice>
-        <mc:Fallback>
+        <mc:Fallback xmlns="">
           <p:sp>
             <p:nvSpPr>
               <p:cNvPr id="94" name="Rectangle: Rounded Corners 93">
@@ -9103,8 +9142,8 @@
           </a:p>
         </p:txBody>
       </p:sp>
-      <mc:AlternateContent xmlns:mc="http://schemas.openxmlformats.org/markup-compatibility/2006">
-        <mc:Choice xmlns:a14="http://schemas.microsoft.com/office/drawing/2010/main" Requires="a14">
+      <mc:AlternateContent xmlns:mc="http://schemas.openxmlformats.org/markup-compatibility/2006" xmlns:a14="http://schemas.microsoft.com/office/drawing/2010/main">
+        <mc:Choice Requires="a14">
           <p:sp>
             <p:nvSpPr>
               <p:cNvPr id="96" name="Rectangle: Rounded Corners 95">
@@ -9194,7 +9233,7 @@
             </p:txBody>
           </p:sp>
         </mc:Choice>
-        <mc:Fallback>
+        <mc:Fallback xmlns="">
           <p:sp>
             <p:nvSpPr>
               <p:cNvPr id="96" name="Rectangle: Rounded Corners 95">
@@ -9870,8 +9909,8 @@
           </a:p>
         </p:txBody>
       </p:sp>
-      <mc:AlternateContent xmlns:mc="http://schemas.openxmlformats.org/markup-compatibility/2006">
-        <mc:Choice xmlns:a14="http://schemas.microsoft.com/office/drawing/2010/main" Requires="a14">
+      <mc:AlternateContent xmlns:mc="http://schemas.openxmlformats.org/markup-compatibility/2006" xmlns:a14="http://schemas.microsoft.com/office/drawing/2010/main">
+        <mc:Choice Requires="a14">
           <p:sp>
             <p:nvSpPr>
               <p:cNvPr id="37" name="TextBox 36">
@@ -10008,7 +10047,7 @@
             </p:txBody>
           </p:sp>
         </mc:Choice>
-        <mc:Fallback>
+        <mc:Fallback xmlns="">
           <p:sp>
             <p:nvSpPr>
               <p:cNvPr id="37" name="TextBox 36">
@@ -10288,8 +10327,8 @@
           </a:p>
         </p:txBody>
       </p:sp>
-      <mc:AlternateContent xmlns:mc="http://schemas.openxmlformats.org/markup-compatibility/2006">
-        <mc:Choice xmlns:a14="http://schemas.microsoft.com/office/drawing/2010/main" Requires="a14">
+      <mc:AlternateContent xmlns:mc="http://schemas.openxmlformats.org/markup-compatibility/2006" xmlns:a14="http://schemas.microsoft.com/office/drawing/2010/main">
+        <mc:Choice Requires="a14">
           <p:sp>
             <p:nvSpPr>
               <p:cNvPr id="39" name="Rectangle: Rounded Corners 38">
@@ -10379,7 +10418,7 @@
             </p:txBody>
           </p:sp>
         </mc:Choice>
-        <mc:Fallback>
+        <mc:Fallback xmlns="">
           <p:sp>
             <p:nvSpPr>
               <p:cNvPr id="39" name="Rectangle: Rounded Corners 38">
@@ -10433,8 +10472,8 @@
           </p:sp>
         </mc:Fallback>
       </mc:AlternateContent>
-      <mc:AlternateContent xmlns:mc="http://schemas.openxmlformats.org/markup-compatibility/2006">
-        <mc:Choice xmlns:a14="http://schemas.microsoft.com/office/drawing/2010/main" Requires="a14">
+      <mc:AlternateContent xmlns:mc="http://schemas.openxmlformats.org/markup-compatibility/2006" xmlns:a14="http://schemas.microsoft.com/office/drawing/2010/main">
+        <mc:Choice Requires="a14">
           <p:sp>
             <p:nvSpPr>
               <p:cNvPr id="40" name="Rectangle: Rounded Corners 39">
@@ -10549,7 +10588,7 @@
             </p:txBody>
           </p:sp>
         </mc:Choice>
-        <mc:Fallback>
+        <mc:Fallback xmlns="">
           <p:sp>
             <p:nvSpPr>
               <p:cNvPr id="40" name="Rectangle: Rounded Corners 39">
@@ -10738,8 +10777,8 @@
           </a:p>
         </p:txBody>
       </p:sp>
-      <mc:AlternateContent xmlns:mc="http://schemas.openxmlformats.org/markup-compatibility/2006">
-        <mc:Choice xmlns:a14="http://schemas.microsoft.com/office/drawing/2010/main" Requires="a14">
+      <mc:AlternateContent xmlns:mc="http://schemas.openxmlformats.org/markup-compatibility/2006" xmlns:a14="http://schemas.microsoft.com/office/drawing/2010/main">
+        <mc:Choice Requires="a14">
           <p:sp>
             <p:nvSpPr>
               <p:cNvPr id="53" name="Rectangle: Rounded Corners 52">
@@ -10829,7 +10868,7 @@
             </p:txBody>
           </p:sp>
         </mc:Choice>
-        <mc:Fallback>
+        <mc:Fallback xmlns="">
           <p:sp>
             <p:nvSpPr>
               <p:cNvPr id="53" name="Rectangle: Rounded Corners 52">
@@ -10883,8 +10922,8 @@
           </p:sp>
         </mc:Fallback>
       </mc:AlternateContent>
-      <mc:AlternateContent xmlns:mc="http://schemas.openxmlformats.org/markup-compatibility/2006">
-        <mc:Choice xmlns:a14="http://schemas.microsoft.com/office/drawing/2010/main" Requires="a14">
+      <mc:AlternateContent xmlns:mc="http://schemas.openxmlformats.org/markup-compatibility/2006" xmlns:a14="http://schemas.microsoft.com/office/drawing/2010/main">
+        <mc:Choice Requires="a14">
           <p:sp>
             <p:nvSpPr>
               <p:cNvPr id="54" name="Rectangle: Rounded Corners 53">
@@ -10999,7 +11038,7 @@
             </p:txBody>
           </p:sp>
         </mc:Choice>
-        <mc:Fallback>
+        <mc:Fallback xmlns="">
           <p:sp>
             <p:nvSpPr>
               <p:cNvPr id="54" name="Rectangle: Rounded Corners 53">
@@ -11090,8 +11129,8 @@
           </a:p>
         </p:txBody>
       </p:sp>
-      <mc:AlternateContent xmlns:mc="http://schemas.openxmlformats.org/markup-compatibility/2006">
-        <mc:Choice xmlns:a14="http://schemas.microsoft.com/office/drawing/2010/main" Requires="a14">
+      <mc:AlternateContent xmlns:mc="http://schemas.openxmlformats.org/markup-compatibility/2006" xmlns:a14="http://schemas.microsoft.com/office/drawing/2010/main">
+        <mc:Choice Requires="a14">
           <p:sp>
             <p:nvSpPr>
               <p:cNvPr id="58" name="Rectangle: Rounded Corners 57">
@@ -11181,7 +11220,7 @@
             </p:txBody>
           </p:sp>
         </mc:Choice>
-        <mc:Fallback>
+        <mc:Fallback xmlns="">
           <p:sp>
             <p:nvSpPr>
               <p:cNvPr id="58" name="Rectangle: Rounded Corners 57">
@@ -11235,8 +11274,8 @@
           </p:sp>
         </mc:Fallback>
       </mc:AlternateContent>
-      <mc:AlternateContent xmlns:mc="http://schemas.openxmlformats.org/markup-compatibility/2006">
-        <mc:Choice xmlns:a14="http://schemas.microsoft.com/office/drawing/2010/main" Requires="a14">
+      <mc:AlternateContent xmlns:mc="http://schemas.openxmlformats.org/markup-compatibility/2006" xmlns:a14="http://schemas.microsoft.com/office/drawing/2010/main">
+        <mc:Choice Requires="a14">
           <p:sp>
             <p:nvSpPr>
               <p:cNvPr id="59" name="Rectangle: Rounded Corners 58">
@@ -11351,7 +11390,7 @@
             </p:txBody>
           </p:sp>
         </mc:Choice>
-        <mc:Fallback>
+        <mc:Fallback xmlns="">
           <p:sp>
             <p:nvSpPr>
               <p:cNvPr id="59" name="Rectangle: Rounded Corners 58">
@@ -11442,8 +11481,8 @@
           </a:p>
         </p:txBody>
       </p:sp>
-      <mc:AlternateContent xmlns:mc="http://schemas.openxmlformats.org/markup-compatibility/2006">
-        <mc:Choice xmlns:a14="http://schemas.microsoft.com/office/drawing/2010/main" Requires="a14">
+      <mc:AlternateContent xmlns:mc="http://schemas.openxmlformats.org/markup-compatibility/2006" xmlns:a14="http://schemas.microsoft.com/office/drawing/2010/main">
+        <mc:Choice Requires="a14">
           <p:sp>
             <p:nvSpPr>
               <p:cNvPr id="61" name="Rectangle: Rounded Corners 60">
@@ -11583,7 +11622,7 @@
             </p:txBody>
           </p:sp>
         </mc:Choice>
-        <mc:Fallback>
+        <mc:Fallback xmlns="">
           <p:sp>
             <p:nvSpPr>
               <p:cNvPr id="61" name="Rectangle: Rounded Corners 60">
@@ -11637,8 +11676,8 @@
           </p:sp>
         </mc:Fallback>
       </mc:AlternateContent>
-      <mc:AlternateContent xmlns:mc="http://schemas.openxmlformats.org/markup-compatibility/2006">
-        <mc:Choice xmlns:a14="http://schemas.microsoft.com/office/drawing/2010/main" Requires="a14">
+      <mc:AlternateContent xmlns:mc="http://schemas.openxmlformats.org/markup-compatibility/2006" xmlns:a14="http://schemas.microsoft.com/office/drawing/2010/main">
+        <mc:Choice Requires="a14">
           <p:sp>
             <p:nvSpPr>
               <p:cNvPr id="62" name="Rectangle: Rounded Corners 61">
@@ -11778,7 +11817,7 @@
             </p:txBody>
           </p:sp>
         </mc:Choice>
-        <mc:Fallback>
+        <mc:Fallback xmlns="">
           <p:sp>
             <p:nvSpPr>
               <p:cNvPr id="62" name="Rectangle: Rounded Corners 61">
@@ -12041,8 +12080,8 @@
           </a:p>
         </p:txBody>
       </p:sp>
-      <mc:AlternateContent xmlns:mc="http://schemas.openxmlformats.org/markup-compatibility/2006">
-        <mc:Choice xmlns:a14="http://schemas.microsoft.com/office/drawing/2010/main" Requires="a14">
+      <mc:AlternateContent xmlns:mc="http://schemas.openxmlformats.org/markup-compatibility/2006" xmlns:a14="http://schemas.microsoft.com/office/drawing/2010/main">
+        <mc:Choice Requires="a14">
           <p:sp>
             <p:nvSpPr>
               <p:cNvPr id="72" name="Rectangle: Rounded Corners 71">
@@ -12132,7 +12171,7 @@
             </p:txBody>
           </p:sp>
         </mc:Choice>
-        <mc:Fallback>
+        <mc:Fallback xmlns="">
           <p:sp>
             <p:nvSpPr>
               <p:cNvPr id="72" name="Rectangle: Rounded Corners 71">
@@ -12186,8 +12225,8 @@
           </p:sp>
         </mc:Fallback>
       </mc:AlternateContent>
-      <mc:AlternateContent xmlns:mc="http://schemas.openxmlformats.org/markup-compatibility/2006">
-        <mc:Choice xmlns:a14="http://schemas.microsoft.com/office/drawing/2010/main" Requires="a14">
+      <mc:AlternateContent xmlns:mc="http://schemas.openxmlformats.org/markup-compatibility/2006" xmlns:a14="http://schemas.microsoft.com/office/drawing/2010/main">
+        <mc:Choice Requires="a14">
           <p:sp>
             <p:nvSpPr>
               <p:cNvPr id="73" name="Rectangle: Rounded Corners 72">
@@ -12302,7 +12341,7 @@
             </p:txBody>
           </p:sp>
         </mc:Choice>
-        <mc:Fallback>
+        <mc:Fallback xmlns="">
           <p:sp>
             <p:nvSpPr>
               <p:cNvPr id="73" name="Rectangle: Rounded Corners 72">
@@ -12393,8 +12432,8 @@
           </a:p>
         </p:txBody>
       </p:sp>
-      <mc:AlternateContent xmlns:mc="http://schemas.openxmlformats.org/markup-compatibility/2006">
-        <mc:Choice xmlns:a14="http://schemas.microsoft.com/office/drawing/2010/main" Requires="a14">
+      <mc:AlternateContent xmlns:mc="http://schemas.openxmlformats.org/markup-compatibility/2006" xmlns:a14="http://schemas.microsoft.com/office/drawing/2010/main">
+        <mc:Choice Requires="a14">
           <p:sp>
             <p:nvSpPr>
               <p:cNvPr id="75" name="Rectangle: Rounded Corners 74">
@@ -12534,7 +12573,7 @@
             </p:txBody>
           </p:sp>
         </mc:Choice>
-        <mc:Fallback>
+        <mc:Fallback xmlns="">
           <p:sp>
             <p:nvSpPr>
               <p:cNvPr id="75" name="Rectangle: Rounded Corners 74">
@@ -12699,8 +12738,8 @@
           </a:p>
         </p:txBody>
       </p:sp>
-      <mc:AlternateContent xmlns:mc="http://schemas.openxmlformats.org/markup-compatibility/2006">
-        <mc:Choice xmlns:a14="http://schemas.microsoft.com/office/drawing/2010/main" Requires="a14">
+      <mc:AlternateContent xmlns:mc="http://schemas.openxmlformats.org/markup-compatibility/2006" xmlns:a14="http://schemas.microsoft.com/office/drawing/2010/main">
+        <mc:Choice Requires="a14">
           <p:sp>
             <p:nvSpPr>
               <p:cNvPr id="79" name="Rectangle: Rounded Corners 78">
@@ -12840,7 +12879,7 @@
             </p:txBody>
           </p:sp>
         </mc:Choice>
-        <mc:Fallback>
+        <mc:Fallback xmlns="">
           <p:sp>
             <p:nvSpPr>
               <p:cNvPr id="79" name="Rectangle: Rounded Corners 78">
@@ -12894,8 +12933,8 @@
           </p:sp>
         </mc:Fallback>
       </mc:AlternateContent>
-      <mc:AlternateContent xmlns:mc="http://schemas.openxmlformats.org/markup-compatibility/2006">
-        <mc:Choice xmlns:a14="http://schemas.microsoft.com/office/drawing/2010/main" Requires="a14">
+      <mc:AlternateContent xmlns:mc="http://schemas.openxmlformats.org/markup-compatibility/2006" xmlns:a14="http://schemas.microsoft.com/office/drawing/2010/main">
+        <mc:Choice Requires="a14">
           <p:sp>
             <p:nvSpPr>
               <p:cNvPr id="80" name="TextBox 79">
@@ -13051,7 +13090,7 @@
             </p:txBody>
           </p:sp>
         </mc:Choice>
-        <mc:Fallback>
+        <mc:Fallback xmlns="">
           <p:sp>
             <p:nvSpPr>
               <p:cNvPr id="80" name="TextBox 79">
@@ -13231,8 +13270,8 @@
           </a:fontRef>
         </p:style>
       </p:cxnSp>
-      <mc:AlternateContent xmlns:mc="http://schemas.openxmlformats.org/markup-compatibility/2006">
-        <mc:Choice xmlns:a14="http://schemas.microsoft.com/office/drawing/2010/main" Requires="a14">
+      <mc:AlternateContent xmlns:mc="http://schemas.openxmlformats.org/markup-compatibility/2006" xmlns:a14="http://schemas.microsoft.com/office/drawing/2010/main">
+        <mc:Choice Requires="a14">
           <p:sp>
             <p:nvSpPr>
               <p:cNvPr id="91" name="Rectangle: Rounded Corners 90">
@@ -13347,7 +13386,7 @@
             </p:txBody>
           </p:sp>
         </mc:Choice>
-        <mc:Fallback>
+        <mc:Fallback xmlns="">
           <p:sp>
             <p:nvSpPr>
               <p:cNvPr id="91" name="Rectangle: Rounded Corners 90">
@@ -13438,8 +13477,8 @@
           </a:p>
         </p:txBody>
       </p:sp>
-      <mc:AlternateContent xmlns:mc="http://schemas.openxmlformats.org/markup-compatibility/2006">
-        <mc:Choice xmlns:a14="http://schemas.microsoft.com/office/drawing/2010/main" Requires="a14">
+      <mc:AlternateContent xmlns:mc="http://schemas.openxmlformats.org/markup-compatibility/2006" xmlns:a14="http://schemas.microsoft.com/office/drawing/2010/main">
+        <mc:Choice Requires="a14">
           <p:sp>
             <p:nvSpPr>
               <p:cNvPr id="93" name="Rectangle: Rounded Corners 92">
@@ -13529,7 +13568,7 @@
             </p:txBody>
           </p:sp>
         </mc:Choice>
-        <mc:Fallback>
+        <mc:Fallback xmlns="">
           <p:sp>
             <p:nvSpPr>
               <p:cNvPr id="93" name="Rectangle: Rounded Corners 92">
@@ -13583,8 +13622,8 @@
           </p:sp>
         </mc:Fallback>
       </mc:AlternateContent>
-      <mc:AlternateContent xmlns:mc="http://schemas.openxmlformats.org/markup-compatibility/2006">
-        <mc:Choice xmlns:a14="http://schemas.microsoft.com/office/drawing/2010/main" Requires="a14">
+      <mc:AlternateContent xmlns:mc="http://schemas.openxmlformats.org/markup-compatibility/2006" xmlns:a14="http://schemas.microsoft.com/office/drawing/2010/main">
+        <mc:Choice Requires="a14">
           <p:sp>
             <p:nvSpPr>
               <p:cNvPr id="94" name="Rectangle: Rounded Corners 93">
@@ -13693,7 +13732,7 @@
             </p:txBody>
           </p:sp>
         </mc:Choice>
-        <mc:Fallback>
+        <mc:Fallback xmlns="">
           <p:sp>
             <p:nvSpPr>
               <p:cNvPr id="94" name="Rectangle: Rounded Corners 93">
@@ -13784,8 +13823,8 @@
           </a:p>
         </p:txBody>
       </p:sp>
-      <mc:AlternateContent xmlns:mc="http://schemas.openxmlformats.org/markup-compatibility/2006">
-        <mc:Choice xmlns:a14="http://schemas.microsoft.com/office/drawing/2010/main" Requires="a14">
+      <mc:AlternateContent xmlns:mc="http://schemas.openxmlformats.org/markup-compatibility/2006" xmlns:a14="http://schemas.microsoft.com/office/drawing/2010/main">
+        <mc:Choice Requires="a14">
           <p:sp>
             <p:nvSpPr>
               <p:cNvPr id="96" name="Rectangle: Rounded Corners 95">
@@ -13875,7 +13914,7 @@
             </p:txBody>
           </p:sp>
         </mc:Choice>
-        <mc:Fallback>
+        <mc:Fallback xmlns="">
           <p:sp>
             <p:nvSpPr>
               <p:cNvPr id="96" name="Rectangle: Rounded Corners 95">

</xml_diff>